<commit_message>
adjust image for assets build
</commit_message>
<xml_diff>
--- a/ci/assets_build.pptx
+++ b/ci/assets_build.pptx
@@ -3361,8 +3361,8 @@
         </p:nvSpPr>
         <p:spPr>
           <a:xfrm>
-            <a:off x="2534144" y="333451"/>
-            <a:ext cx="7036078" cy="6257849"/>
+            <a:off x="2310350" y="57807"/>
+            <a:ext cx="7259872" cy="6747641"/>
           </a:xfrm>
           <a:prstGeom prst="rect">
             <a:avLst/>
@@ -3787,7 +3787,7 @@
             <a:pPr algn="ctr"/>
             <a:r>
               <a:rPr lang="de-DE" dirty="0" err="1"/>
-              <a:t>Hosted</a:t>
+              <a:t>hosted</a:t>
             </a:r>
             <a:r>
               <a:rPr lang="de-DE" dirty="0"/>
@@ -5681,6 +5681,339 @@
                 <a:schemeClr val="tx1"/>
               </a:solidFill>
             </a:endParaRPr>
+          </a:p>
+        </p:txBody>
+      </p:sp>
+      <p:sp>
+        <p:nvSpPr>
+          <p:cNvPr id="30" name="Callout: Bent Line 29">
+            <a:extLst>
+              <a:ext uri="{FF2B5EF4-FFF2-40B4-BE49-F238E27FC236}">
+                <a16:creationId xmlns:a16="http://schemas.microsoft.com/office/drawing/2014/main" id="{9BF736CD-737F-49AD-9DCA-7BB104E31697}"/>
+              </a:ext>
+            </a:extLst>
+          </p:cNvPr>
+          <p:cNvSpPr/>
+          <p:nvPr/>
+        </p:nvSpPr>
+        <p:spPr>
+          <a:xfrm>
+            <a:off x="3868635" y="6090067"/>
+            <a:ext cx="1922753" cy="496731"/>
+          </a:xfrm>
+          <a:prstGeom prst="borderCallout2">
+            <a:avLst>
+              <a:gd name="adj1" fmla="val 18750"/>
+              <a:gd name="adj2" fmla="val -8333"/>
+              <a:gd name="adj3" fmla="val 18750"/>
+              <a:gd name="adj4" fmla="val -16667"/>
+              <a:gd name="adj5" fmla="val -52541"/>
+              <a:gd name="adj6" fmla="val -46394"/>
+            </a:avLst>
+          </a:prstGeom>
+        </p:spPr>
+        <p:style>
+          <a:lnRef idx="2">
+            <a:schemeClr val="accent3">
+              <a:shade val="50000"/>
+            </a:schemeClr>
+          </a:lnRef>
+          <a:fillRef idx="1">
+            <a:schemeClr val="accent3"/>
+          </a:fillRef>
+          <a:effectRef idx="0">
+            <a:schemeClr val="accent3"/>
+          </a:effectRef>
+          <a:fontRef idx="minor">
+            <a:schemeClr val="lt1"/>
+          </a:fontRef>
+        </p:style>
+        <p:txBody>
+          <a:bodyPr rtlCol="0" anchor="ctr"/>
+          <a:lstStyle/>
+          <a:p>
+            <a:pPr algn="ctr"/>
+            <a:r>
+              <a:rPr lang="de-DE" sz="1400" dirty="0" err="1"/>
+              <a:t>Dockerfile.assets.server</a:t>
+            </a:r>
+            <a:endParaRPr lang="en-US" sz="1400" dirty="0"/>
+          </a:p>
+        </p:txBody>
+      </p:sp>
+      <p:sp>
+        <p:nvSpPr>
+          <p:cNvPr id="34" name="Rectangle 33">
+            <a:extLst>
+              <a:ext uri="{FF2B5EF4-FFF2-40B4-BE49-F238E27FC236}">
+                <a16:creationId xmlns:a16="http://schemas.microsoft.com/office/drawing/2014/main" id="{21AB484E-B53C-45D3-A4D8-3C2FCF1DC238}"/>
+              </a:ext>
+            </a:extLst>
+          </p:cNvPr>
+          <p:cNvSpPr/>
+          <p:nvPr/>
+        </p:nvSpPr>
+        <p:spPr>
+          <a:xfrm>
+            <a:off x="2483777" y="2196342"/>
+            <a:ext cx="1865583" cy="3629425"/>
+          </a:xfrm>
+          <a:prstGeom prst="rect">
+            <a:avLst/>
+          </a:prstGeom>
+          <a:noFill/>
+          <a:ln w="9525" cap="flat" cmpd="sng" algn="ctr">
+            <a:solidFill>
+              <a:schemeClr val="accent1"/>
+            </a:solidFill>
+            <a:prstDash val="solid"/>
+            <a:round/>
+            <a:headEnd type="none" w="med" len="med"/>
+            <a:tailEnd type="none" w="med" len="med"/>
+          </a:ln>
+        </p:spPr>
+        <p:style>
+          <a:lnRef idx="0">
+            <a:scrgbClr r="0" g="0" b="0"/>
+          </a:lnRef>
+          <a:fillRef idx="0">
+            <a:scrgbClr r="0" g="0" b="0"/>
+          </a:fillRef>
+          <a:effectRef idx="0">
+            <a:scrgbClr r="0" g="0" b="0"/>
+          </a:effectRef>
+          <a:fontRef idx="minor">
+            <a:schemeClr val="accent1"/>
+          </a:fontRef>
+        </p:style>
+        <p:txBody>
+          <a:bodyPr rtlCol="0" anchor="ctr"/>
+          <a:lstStyle/>
+          <a:p>
+            <a:pPr algn="ctr"/>
+            <a:endParaRPr lang="en-US" dirty="0"/>
+          </a:p>
+        </p:txBody>
+      </p:sp>
+      <p:sp>
+        <p:nvSpPr>
+          <p:cNvPr id="57" name="Rectangle 56">
+            <a:extLst>
+              <a:ext uri="{FF2B5EF4-FFF2-40B4-BE49-F238E27FC236}">
+                <a16:creationId xmlns:a16="http://schemas.microsoft.com/office/drawing/2014/main" id="{766A1B6E-6D76-468A-A759-0CD96ACA579E}"/>
+              </a:ext>
+            </a:extLst>
+          </p:cNvPr>
+          <p:cNvSpPr/>
+          <p:nvPr/>
+        </p:nvSpPr>
+        <p:spPr>
+          <a:xfrm>
+            <a:off x="6096000" y="3929455"/>
+            <a:ext cx="2150302" cy="2780890"/>
+          </a:xfrm>
+          <a:prstGeom prst="rect">
+            <a:avLst/>
+          </a:prstGeom>
+          <a:noFill/>
+          <a:ln w="9525" cap="flat" cmpd="sng" algn="ctr">
+            <a:solidFill>
+              <a:schemeClr val="accent1"/>
+            </a:solidFill>
+            <a:prstDash val="solid"/>
+            <a:round/>
+            <a:headEnd type="none" w="med" len="med"/>
+            <a:tailEnd type="none" w="med" len="med"/>
+          </a:ln>
+        </p:spPr>
+        <p:style>
+          <a:lnRef idx="0">
+            <a:scrgbClr r="0" g="0" b="0"/>
+          </a:lnRef>
+          <a:fillRef idx="0">
+            <a:scrgbClr r="0" g="0" b="0"/>
+          </a:fillRef>
+          <a:effectRef idx="0">
+            <a:scrgbClr r="0" g="0" b="0"/>
+          </a:effectRef>
+          <a:fontRef idx="minor">
+            <a:schemeClr val="accent1"/>
+          </a:fontRef>
+        </p:style>
+        <p:txBody>
+          <a:bodyPr rtlCol="0" anchor="ctr"/>
+          <a:lstStyle/>
+          <a:p>
+            <a:pPr algn="ctr"/>
+            <a:endParaRPr lang="en-US"/>
+          </a:p>
+        </p:txBody>
+      </p:sp>
+      <p:sp>
+        <p:nvSpPr>
+          <p:cNvPr id="58" name="Callout: Bent Line 57">
+            <a:extLst>
+              <a:ext uri="{FF2B5EF4-FFF2-40B4-BE49-F238E27FC236}">
+                <a16:creationId xmlns:a16="http://schemas.microsoft.com/office/drawing/2014/main" id="{67D6D884-D21B-4256-806C-B34FDEAE487B}"/>
+              </a:ext>
+            </a:extLst>
+          </p:cNvPr>
+          <p:cNvSpPr/>
+          <p:nvPr/>
+        </p:nvSpPr>
+        <p:spPr>
+          <a:xfrm>
+            <a:off x="9128267" y="5987569"/>
+            <a:ext cx="1518713" cy="496731"/>
+          </a:xfrm>
+          <a:prstGeom prst="borderCallout2">
+            <a:avLst>
+              <a:gd name="adj1" fmla="val 18750"/>
+              <a:gd name="adj2" fmla="val -8333"/>
+              <a:gd name="adj3" fmla="val 18750"/>
+              <a:gd name="adj4" fmla="val -16667"/>
+              <a:gd name="adj5" fmla="val 75471"/>
+              <a:gd name="adj6" fmla="val -58086"/>
+            </a:avLst>
+          </a:prstGeom>
+        </p:spPr>
+        <p:style>
+          <a:lnRef idx="2">
+            <a:schemeClr val="accent3">
+              <a:shade val="50000"/>
+            </a:schemeClr>
+          </a:lnRef>
+          <a:fillRef idx="1">
+            <a:schemeClr val="accent3"/>
+          </a:fillRef>
+          <a:effectRef idx="0">
+            <a:schemeClr val="accent3"/>
+          </a:effectRef>
+          <a:fontRef idx="minor">
+            <a:schemeClr val="lt1"/>
+          </a:fontRef>
+        </p:style>
+        <p:txBody>
+          <a:bodyPr rtlCol="0" anchor="ctr"/>
+          <a:lstStyle/>
+          <a:p>
+            <a:pPr algn="ctr"/>
+            <a:r>
+              <a:rPr lang="de-DE" sz="1400" dirty="0" err="1"/>
+              <a:t>Dockerfile.asset</a:t>
+            </a:r>
+            <a:endParaRPr lang="en-US" sz="1400" dirty="0"/>
+          </a:p>
+        </p:txBody>
+      </p:sp>
+      <p:sp>
+        <p:nvSpPr>
+          <p:cNvPr id="59" name="Callout: Bent Line 58">
+            <a:extLst>
+              <a:ext uri="{FF2B5EF4-FFF2-40B4-BE49-F238E27FC236}">
+                <a16:creationId xmlns:a16="http://schemas.microsoft.com/office/drawing/2014/main" id="{62C52B6B-4880-45BE-B30A-074294315D71}"/>
+              </a:ext>
+            </a:extLst>
+          </p:cNvPr>
+          <p:cNvSpPr/>
+          <p:nvPr/>
+        </p:nvSpPr>
+        <p:spPr>
+          <a:xfrm>
+            <a:off x="9518877" y="137998"/>
+            <a:ext cx="1518713" cy="496731"/>
+          </a:xfrm>
+          <a:prstGeom prst="borderCallout2">
+            <a:avLst>
+              <a:gd name="adj1" fmla="val 18750"/>
+              <a:gd name="adj2" fmla="val -8333"/>
+              <a:gd name="adj3" fmla="val 18750"/>
+              <a:gd name="adj4" fmla="val -16667"/>
+              <a:gd name="adj5" fmla="val 75471"/>
+              <a:gd name="adj6" fmla="val -58086"/>
+            </a:avLst>
+          </a:prstGeom>
+        </p:spPr>
+        <p:style>
+          <a:lnRef idx="2">
+            <a:schemeClr val="accent3">
+              <a:shade val="50000"/>
+            </a:schemeClr>
+          </a:lnRef>
+          <a:fillRef idx="1">
+            <a:schemeClr val="accent3"/>
+          </a:fillRef>
+          <a:effectRef idx="0">
+            <a:schemeClr val="accent3"/>
+          </a:effectRef>
+          <a:fontRef idx="minor">
+            <a:schemeClr val="lt1"/>
+          </a:fontRef>
+        </p:style>
+        <p:txBody>
+          <a:bodyPr rtlCol="0" anchor="ctr"/>
+          <a:lstStyle/>
+          <a:p>
+            <a:pPr algn="ctr"/>
+            <a:r>
+              <a:rPr lang="de-DE" sz="1400" dirty="0" err="1"/>
+              <a:t>Dockerfile.base</a:t>
+            </a:r>
+            <a:endParaRPr lang="en-US" sz="1400" dirty="0"/>
+          </a:p>
+        </p:txBody>
+      </p:sp>
+      <p:sp>
+        <p:nvSpPr>
+          <p:cNvPr id="60" name="Rectangle 59">
+            <a:extLst>
+              <a:ext uri="{FF2B5EF4-FFF2-40B4-BE49-F238E27FC236}">
+                <a16:creationId xmlns:a16="http://schemas.microsoft.com/office/drawing/2014/main" id="{AE96A5A8-407D-44B4-B15F-35459C206428}"/>
+              </a:ext>
+            </a:extLst>
+          </p:cNvPr>
+          <p:cNvSpPr/>
+          <p:nvPr/>
+        </p:nvSpPr>
+        <p:spPr>
+          <a:xfrm>
+            <a:off x="6948363" y="414323"/>
+            <a:ext cx="1685886" cy="1518086"/>
+          </a:xfrm>
+          <a:prstGeom prst="rect">
+            <a:avLst/>
+          </a:prstGeom>
+          <a:noFill/>
+          <a:ln w="9525" cap="flat" cmpd="sng" algn="ctr">
+            <a:solidFill>
+              <a:schemeClr val="accent1"/>
+            </a:solidFill>
+            <a:prstDash val="solid"/>
+            <a:round/>
+            <a:headEnd type="none" w="med" len="med"/>
+            <a:tailEnd type="none" w="med" len="med"/>
+          </a:ln>
+        </p:spPr>
+        <p:style>
+          <a:lnRef idx="0">
+            <a:scrgbClr r="0" g="0" b="0"/>
+          </a:lnRef>
+          <a:fillRef idx="0">
+            <a:scrgbClr r="0" g="0" b="0"/>
+          </a:fillRef>
+          <a:effectRef idx="0">
+            <a:scrgbClr r="0" g="0" b="0"/>
+          </a:effectRef>
+          <a:fontRef idx="minor">
+            <a:schemeClr val="accent1"/>
+          </a:fontRef>
+        </p:style>
+        <p:txBody>
+          <a:bodyPr rtlCol="0" anchor="ctr"/>
+          <a:lstStyle/>
+          <a:p>
+            <a:pPr algn="ctr"/>
+            <a:endParaRPr lang="en-US"/>
           </a:p>
         </p:txBody>
       </p:sp>

</xml_diff>

<commit_message>
adjust docu to build assets
</commit_message>
<xml_diff>
--- a/ci/assets_build.pptx
+++ b/ci/assets_build.pptx
@@ -3361,7 +3361,7 @@
         </p:nvSpPr>
         <p:spPr>
           <a:xfrm>
-            <a:off x="2310350" y="57807"/>
+            <a:off x="2298673" y="55179"/>
             <a:ext cx="7259872" cy="6747641"/>
           </a:xfrm>
           <a:prstGeom prst="rect">
@@ -3413,8 +3413,8 @@
         </p:nvSpPr>
         <p:spPr>
           <a:xfrm>
-            <a:off x="2640035" y="2403478"/>
-            <a:ext cx="1550965" cy="3253026"/>
+            <a:off x="2545445" y="2287439"/>
+            <a:ext cx="1550965" cy="3369065"/>
           </a:xfrm>
           <a:prstGeom prst="rect">
             <a:avLst/>
@@ -3448,6 +3448,10 @@
           <a:p>
             <a:pPr algn="ctr"/>
             <a:endParaRPr lang="de-DE" dirty="0"/>
+          </a:p>
+          <a:p>
+            <a:pPr algn="ctr"/>
+            <a:endParaRPr lang="en-US" dirty="0"/>
           </a:p>
           <a:p>
             <a:pPr algn="ctr"/>
@@ -4006,7 +4010,23 @@
             <a:pPr algn="ctr"/>
             <a:r>
               <a:rPr lang="de-DE" sz="1400" dirty="0"/>
-              <a:t>1) </a:t>
+              <a:t>1) on </a:t>
+            </a:r>
+            <a:r>
+              <a:rPr lang="de-DE" sz="1400" dirty="0" err="1"/>
+              <a:t>base</a:t>
+            </a:r>
+            <a:r>
+              <a:rPr lang="de-DE" sz="1400" dirty="0"/>
+              <a:t> </a:t>
+            </a:r>
+            <a:r>
+              <a:rPr lang="de-DE" sz="1400" dirty="0" err="1"/>
+              <a:t>layer</a:t>
+            </a:r>
+            <a:r>
+              <a:rPr lang="de-DE" sz="1400" dirty="0"/>
+              <a:t>, </a:t>
             </a:r>
             <a:r>
               <a:rPr lang="de-DE" sz="1400" dirty="0" err="1"/>
@@ -4018,7 +4038,7 @@
             </a:r>
             <a:r>
               <a:rPr lang="de-DE" sz="1400" dirty="0" err="1"/>
-              <a:t>app</a:t>
+              <a:t>the</a:t>
             </a:r>
             <a:r>
               <a:rPr lang="de-DE" sz="1400" dirty="0"/>
@@ -4026,15 +4046,23 @@
             </a:r>
             <a:r>
               <a:rPr lang="de-DE" sz="1400" dirty="0" err="1"/>
-              <a:t>with</a:t>
+              <a:t>app</a:t>
             </a:r>
             <a:r>
               <a:rPr lang="de-DE" sz="1400" dirty="0"/>
-              <a:t> Base </a:t>
+              <a:t> </a:t>
             </a:r>
             <a:r>
               <a:rPr lang="de-DE" sz="1400" dirty="0" err="1"/>
-              <a:t>image</a:t>
+              <a:t>or</a:t>
+            </a:r>
+            <a:r>
+              <a:rPr lang="de-DE" sz="1400" dirty="0"/>
+              <a:t> </a:t>
+            </a:r>
+            <a:r>
+              <a:rPr lang="de-DE" sz="1400" dirty="0" err="1"/>
+              <a:t>lib</a:t>
             </a:r>
             <a:endParaRPr lang="en-US" sz="1400" dirty="0"/>
           </a:p>
@@ -4364,7 +4392,7 @@
         <p:spPr>
           <a:xfrm>
             <a:off x="6948363" y="4985480"/>
-            <a:ext cx="14462" cy="659385"/>
+            <a:ext cx="14462" cy="659384"/>
           </a:xfrm>
           <a:prstGeom prst="straightConnector1">
             <a:avLst/>
@@ -4402,8 +4430,8 @@
         </p:nvSpPr>
         <p:spPr>
           <a:xfrm>
-            <a:off x="6358689" y="5644865"/>
-            <a:ext cx="1208272" cy="845224"/>
+            <a:off x="6358689" y="5644864"/>
+            <a:ext cx="1208272" cy="941933"/>
           </a:xfrm>
           <a:prstGeom prst="rect">
             <a:avLst/>
@@ -4449,7 +4477,11 @@
             </a:r>
             <a:r>
               <a:rPr lang="de-DE" sz="1400" dirty="0" err="1"/>
-              <a:t>assets</a:t>
+              <a:t>build</a:t>
+            </a:r>
+            <a:r>
+              <a:rPr lang="de-DE" sz="1400"/>
+              <a:t> asset</a:t>
             </a:r>
             <a:r>
               <a:rPr lang="de-DE" sz="1400" dirty="0"/>
@@ -4482,6 +4514,30 @@
             <a:r>
               <a:rPr lang="de-DE" sz="1400" dirty="0" err="1"/>
               <a:t>layer</a:t>
+            </a:r>
+            <a:endParaRPr lang="de-DE" sz="1400" dirty="0"/>
+          </a:p>
+          <a:p>
+            <a:pPr algn="ctr"/>
+            <a:r>
+              <a:rPr lang="de-DE" sz="1400" dirty="0"/>
+              <a:t>/</a:t>
+            </a:r>
+            <a:r>
+              <a:rPr lang="de-DE" sz="1400" dirty="0" err="1"/>
+              <a:t>dist</a:t>
+            </a:r>
+            <a:r>
+              <a:rPr lang="de-DE" sz="1400" dirty="0"/>
+              <a:t>/</a:t>
+            </a:r>
+            <a:r>
+              <a:rPr lang="de-DE" sz="1400" dirty="0" err="1"/>
+              <a:t>build</a:t>
+            </a:r>
+            <a:r>
+              <a:rPr lang="de-DE" sz="1400" dirty="0"/>
+              <a:t>/</a:t>
             </a:r>
             <a:endParaRPr lang="en-US" sz="1400" dirty="0"/>
           </a:p>
@@ -4719,8 +4775,8 @@
         </p:nvSpPr>
         <p:spPr>
           <a:xfrm>
-            <a:off x="2753236" y="2547617"/>
-            <a:ext cx="1208272" cy="882386"/>
+            <a:off x="2668708" y="2345509"/>
+            <a:ext cx="1277035" cy="1239741"/>
           </a:xfrm>
           <a:prstGeom prst="rect">
             <a:avLst/>
@@ -4753,38 +4809,117 @@
           <a:p>
             <a:pPr algn="ctr"/>
             <a:r>
-              <a:rPr lang="de-DE" sz="1400" dirty="0"/>
-              <a:t>5) </a:t>
-            </a:r>
-            <a:r>
-              <a:rPr lang="de-DE" sz="1400" dirty="0" err="1"/>
+              <a:rPr lang="de-DE" sz="1100" dirty="0"/>
+              <a:t>5) on </a:t>
+            </a:r>
+            <a:r>
+              <a:rPr lang="de-DE" sz="1100" dirty="0" err="1"/>
+              <a:t>base</a:t>
+            </a:r>
+            <a:r>
+              <a:rPr lang="de-DE" sz="1100" dirty="0"/>
+              <a:t> </a:t>
+            </a:r>
+            <a:r>
+              <a:rPr lang="de-DE" sz="1100" dirty="0" err="1"/>
+              <a:t>layer</a:t>
+            </a:r>
+            <a:r>
+              <a:rPr lang="de-DE" sz="1100" dirty="0"/>
+              <a:t> </a:t>
+            </a:r>
+            <a:r>
+              <a:rPr lang="de-DE" sz="1100" dirty="0" err="1"/>
+              <a:t>copy</a:t>
+            </a:r>
+            <a:r>
+              <a:rPr lang="de-DE" sz="1100" dirty="0"/>
+              <a:t> </a:t>
+            </a:r>
+            <a:r>
+              <a:rPr lang="de-DE" sz="1100" dirty="0" err="1"/>
+              <a:t>input</a:t>
+            </a:r>
+            <a:r>
+              <a:rPr lang="de-DE" sz="1100" dirty="0"/>
+              <a:t> (</a:t>
+            </a:r>
+            <a:r>
+              <a:rPr lang="de-DE" sz="1100" dirty="0" err="1"/>
+              <a:t>dist</a:t>
+            </a:r>
+            <a:r>
+              <a:rPr lang="de-DE" sz="1100" dirty="0"/>
+              <a:t>) </a:t>
+            </a:r>
+            <a:r>
+              <a:rPr lang="de-DE" sz="1100" dirty="0" err="1"/>
+              <a:t>to</a:t>
+            </a:r>
+            <a:r>
+              <a:rPr lang="de-DE" sz="1100" dirty="0"/>
+              <a:t> /</a:t>
+            </a:r>
+            <a:r>
+              <a:rPr lang="de-DE" sz="1100" dirty="0" err="1"/>
+              <a:t>tmp</a:t>
+            </a:r>
+            <a:r>
+              <a:rPr lang="de-DE" sz="1100" dirty="0"/>
+              <a:t>/</a:t>
+            </a:r>
+            <a:r>
+              <a:rPr lang="de-DE" sz="1100" dirty="0" err="1"/>
+              <a:t>latest</a:t>
+            </a:r>
+            <a:r>
+              <a:rPr lang="de-DE" sz="1100" dirty="0"/>
+              <a:t>/ </a:t>
+            </a:r>
+          </a:p>
+          <a:p>
+            <a:pPr algn="ctr"/>
+            <a:r>
+              <a:rPr lang="de-DE" sz="1100" dirty="0"/>
+              <a:t>and </a:t>
+            </a:r>
+            <a:endParaRPr lang="en-US" sz="1100" dirty="0"/>
+          </a:p>
+          <a:p>
+            <a:pPr algn="ctr"/>
+            <a:r>
+              <a:rPr lang="de-DE" sz="1100" dirty="0"/>
+              <a:t> </a:t>
+            </a:r>
+            <a:r>
+              <a:rPr lang="de-DE" sz="1100" dirty="0" err="1"/>
               <a:t>build</a:t>
             </a:r>
             <a:r>
-              <a:rPr lang="de-DE" sz="1400" dirty="0"/>
+              <a:rPr lang="de-DE" sz="1100" dirty="0"/>
               <a:t> </a:t>
             </a:r>
             <a:r>
-              <a:rPr lang="de-DE" sz="1400" dirty="0" err="1"/>
+              <a:rPr lang="de-DE" sz="1100" dirty="0" err="1"/>
               <a:t>importmap</a:t>
             </a:r>
             <a:r>
-              <a:rPr lang="de-DE" sz="1400" dirty="0"/>
+              <a:rPr lang="de-DE" sz="1100" dirty="0"/>
               <a:t> and manifest </a:t>
             </a:r>
             <a:r>
-              <a:rPr lang="de-DE" sz="1400" dirty="0" err="1"/>
+              <a:rPr lang="de-DE" sz="1100" dirty="0" err="1"/>
               <a:t>from</a:t>
             </a:r>
             <a:r>
-              <a:rPr lang="de-DE" sz="1400" dirty="0"/>
+              <a:rPr lang="de-DE" sz="1100" dirty="0"/>
               <a:t> </a:t>
             </a:r>
             <a:r>
-              <a:rPr lang="de-DE" sz="1400" dirty="0" err="1"/>
-              <a:t>dist</a:t>
-            </a:r>
-            <a:endParaRPr lang="en-US" sz="1400" dirty="0"/>
+              <a:rPr lang="de-DE" sz="1100" dirty="0" err="1"/>
+              <a:t>package.json</a:t>
+            </a:r>
+            <a:endParaRPr lang="en-US" sz="1100" dirty="0"/>
           </a:p>
         </p:txBody>
       </p:sp>
@@ -4806,8 +4941,8 @@
         </p:nvCxnSpPr>
         <p:spPr>
           <a:xfrm flipH="1">
-            <a:off x="3961508" y="2621057"/>
-            <a:ext cx="6264395" cy="367753"/>
+            <a:off x="3945743" y="2621057"/>
+            <a:ext cx="6280160" cy="344323"/>
           </a:xfrm>
           <a:prstGeom prst="straightConnector1">
             <a:avLst/>
@@ -4846,8 +4981,8 @@
         </p:nvSpPr>
         <p:spPr>
           <a:xfrm>
-            <a:off x="2749614" y="3692261"/>
-            <a:ext cx="1208272" cy="1137711"/>
+            <a:off x="2660535" y="3860796"/>
+            <a:ext cx="1297351" cy="969175"/>
           </a:xfrm>
           <a:prstGeom prst="rect">
             <a:avLst/>
@@ -4880,62 +5015,90 @@
           <a:p>
             <a:pPr algn="ctr"/>
             <a:r>
-              <a:rPr lang="de-DE" sz="1400" dirty="0"/>
+              <a:rPr lang="de-DE" sz="1100" dirty="0"/>
               <a:t>6) </a:t>
             </a:r>
             <a:r>
-              <a:rPr lang="de-DE" sz="1400" dirty="0" err="1"/>
+              <a:rPr lang="de-DE" sz="1100" dirty="0" err="1"/>
               <a:t>copy</a:t>
             </a:r>
             <a:r>
-              <a:rPr lang="de-DE" sz="1400" dirty="0"/>
+              <a:rPr lang="de-DE" sz="1100" dirty="0"/>
               <a:t> </a:t>
             </a:r>
             <a:r>
-              <a:rPr lang="de-DE" sz="1400" dirty="0" err="1"/>
+              <a:rPr lang="de-DE" sz="1100" dirty="0" err="1"/>
               <a:t>importmap</a:t>
             </a:r>
             <a:r>
-              <a:rPr lang="de-DE" sz="1400" dirty="0"/>
+              <a:rPr lang="de-DE" sz="1100" dirty="0"/>
+              <a:t> manifest and /</a:t>
+            </a:r>
+            <a:r>
+              <a:rPr lang="de-DE" sz="1100" dirty="0" err="1"/>
+              <a:t>tmp</a:t>
+            </a:r>
+            <a:r>
+              <a:rPr lang="de-DE" sz="1100" dirty="0"/>
+              <a:t>/</a:t>
+            </a:r>
+            <a:r>
+              <a:rPr lang="de-DE" sz="1100" dirty="0" err="1"/>
+              <a:t>latest</a:t>
+            </a:r>
+            <a:r>
+              <a:rPr lang="de-DE" sz="1100" dirty="0"/>
+              <a:t>/ </a:t>
+            </a:r>
+            <a:r>
+              <a:rPr lang="de-DE" sz="1100" dirty="0" err="1"/>
+              <a:t>to</a:t>
+            </a:r>
+            <a:r>
+              <a:rPr lang="de-DE" sz="1100" dirty="0"/>
               <a:t> </a:t>
             </a:r>
             <a:r>
-              <a:rPr lang="de-DE" sz="1400" dirty="0" err="1"/>
-              <a:t>manifests</a:t>
-            </a:r>
-            <a:r>
-              <a:rPr lang="de-DE" sz="1400" dirty="0"/>
-              <a:t> and </a:t>
-            </a:r>
-            <a:r>
-              <a:rPr lang="de-DE" sz="1400" dirty="0" err="1"/>
-              <a:t>builds</a:t>
-            </a:r>
-            <a:r>
-              <a:rPr lang="de-DE" sz="1400" dirty="0"/>
+              <a:rPr lang="de-DE" sz="1100" dirty="0" err="1"/>
+              <a:t>assets</a:t>
+            </a:r>
+            <a:r>
+              <a:rPr lang="de-DE" sz="1100" dirty="0"/>
               <a:t> </a:t>
             </a:r>
             <a:r>
-              <a:rPr lang="de-DE" sz="1400" dirty="0" err="1"/>
-              <a:t>to</a:t>
-            </a:r>
-            <a:r>
-              <a:rPr lang="de-DE" sz="1400" dirty="0"/>
+              <a:rPr lang="de-DE" sz="1100" dirty="0" err="1"/>
+              <a:t>server</a:t>
+            </a:r>
+            <a:r>
+              <a:rPr lang="de-DE" sz="1100" dirty="0"/>
               <a:t> </a:t>
             </a:r>
             <a:r>
-              <a:rPr lang="de-DE" sz="1400" dirty="0" err="1"/>
-              <a:t>assets</a:t>
-            </a:r>
-            <a:r>
-              <a:rPr lang="de-DE" sz="1400" dirty="0"/>
+              <a:rPr lang="de-DE" sz="1100" dirty="0" err="1"/>
+              <a:t>layer</a:t>
+            </a:r>
+            <a:r>
+              <a:rPr lang="de-DE" sz="1100" dirty="0"/>
+              <a:t>  </a:t>
+            </a:r>
+            <a:r>
+              <a:rPr lang="de-DE" sz="1100" dirty="0" err="1"/>
+              <a:t>nginx</a:t>
+            </a:r>
+            <a:r>
+              <a:rPr lang="de-DE" sz="1100" dirty="0"/>
               <a:t> </a:t>
             </a:r>
             <a:r>
-              <a:rPr lang="de-DE" sz="1400" dirty="0" err="1"/>
-              <a:t>server</a:t>
-            </a:r>
-            <a:endParaRPr lang="en-US" sz="1400" dirty="0"/>
+              <a:rPr lang="de-DE" sz="1100" dirty="0" err="1"/>
+              <a:t>html</a:t>
+            </a:r>
+            <a:r>
+              <a:rPr lang="de-DE" sz="1100" dirty="0"/>
+              <a:t>/</a:t>
+            </a:r>
+            <a:endParaRPr lang="en-US" sz="1100" dirty="0"/>
           </a:p>
         </p:txBody>
       </p:sp>
@@ -4958,7 +5121,7 @@
         <p:spPr>
           <a:xfrm flipH="1">
             <a:off x="3957886" y="3234498"/>
-            <a:ext cx="6268017" cy="1026619"/>
+            <a:ext cx="6268017" cy="1110886"/>
           </a:xfrm>
           <a:prstGeom prst="straightConnector1">
             <a:avLst/>
@@ -5097,8 +5260,8 @@
         </p:nvSpPr>
         <p:spPr>
           <a:xfrm>
-            <a:off x="2753236" y="1091435"/>
-            <a:ext cx="1208272" cy="882386"/>
+            <a:off x="2637178" y="536489"/>
+            <a:ext cx="1345798" cy="1437332"/>
           </a:xfrm>
           <a:prstGeom prst="rect">
             <a:avLst/>
@@ -5144,7 +5307,7 @@
             </a:r>
             <a:r>
               <a:rPr lang="de-DE" sz="1400" dirty="0" err="1"/>
-              <a:t>builds</a:t>
+              <a:t>build</a:t>
             </a:r>
             <a:r>
               <a:rPr lang="de-DE" sz="1400" dirty="0"/>
@@ -5169,6 +5332,34 @@
             <a:r>
               <a:rPr lang="de-DE" sz="1400" dirty="0" err="1"/>
               <a:t>images</a:t>
+            </a:r>
+            <a:endParaRPr lang="de-DE" sz="1400" dirty="0"/>
+          </a:p>
+          <a:p>
+            <a:pPr algn="ctr"/>
+            <a:r>
+              <a:rPr lang="de-DE" sz="1400" dirty="0"/>
+              <a:t>/</a:t>
+            </a:r>
+            <a:r>
+              <a:rPr lang="de-DE" sz="1400" dirty="0" err="1"/>
+              <a:t>dist</a:t>
+            </a:r>
+            <a:r>
+              <a:rPr lang="de-DE" sz="1400" dirty="0"/>
+              <a:t>/</a:t>
+            </a:r>
+            <a:r>
+              <a:rPr lang="de-DE" sz="1400" dirty="0" err="1"/>
+              <a:t>build</a:t>
+            </a:r>
+            <a:r>
+              <a:rPr lang="de-DE" sz="1400" dirty="0"/>
+              <a:t>/ </a:t>
+            </a:r>
+            <a:r>
+              <a:rPr lang="de-DE" sz="1400" dirty="0" err="1"/>
+              <a:t>to</a:t>
             </a:r>
             <a:r>
               <a:rPr lang="de-DE" sz="1400" dirty="0"/>
@@ -5203,6 +5394,7 @@
             </a:extLst>
           </p:cNvPr>
           <p:cNvCxnSpPr>
+            <a:cxnSpLocks/>
             <a:stCxn id="7" idx="1"/>
             <a:endCxn id="64" idx="3"/>
           </p:cNvCxnSpPr>
@@ -5210,8 +5402,8 @@
         </p:nvCxnSpPr>
         <p:spPr>
           <a:xfrm flipH="1" flipV="1">
-            <a:off x="3961508" y="1532628"/>
-            <a:ext cx="6264394" cy="2328170"/>
+            <a:off x="3982976" y="1255155"/>
+            <a:ext cx="6242926" cy="2605643"/>
           </a:xfrm>
           <a:prstGeom prst="straightConnector1">
             <a:avLst/>
@@ -5253,8 +5445,8 @@
         </p:nvCxnSpPr>
         <p:spPr>
           <a:xfrm flipH="1" flipV="1">
-            <a:off x="3961507" y="1699810"/>
-            <a:ext cx="6264394" cy="2838389"/>
+            <a:off x="3980125" y="1556430"/>
+            <a:ext cx="6245776" cy="2981769"/>
           </a:xfrm>
           <a:prstGeom prst="straightConnector1">
             <a:avLst/>
@@ -5296,8 +5488,8 @@
         </p:nvCxnSpPr>
         <p:spPr>
           <a:xfrm flipH="1" flipV="1">
-            <a:off x="3961507" y="1850067"/>
-            <a:ext cx="6264394" cy="3376780"/>
+            <a:off x="3985827" y="1913357"/>
+            <a:ext cx="6240074" cy="3313490"/>
           </a:xfrm>
           <a:prstGeom prst="straightConnector1">
             <a:avLst/>
@@ -5331,13 +5523,15 @@
               </a:ext>
             </a:extLst>
           </p:cNvPr>
-          <p:cNvCxnSpPr/>
+          <p:cNvCxnSpPr>
+            <a:cxnSpLocks/>
+          </p:cNvCxnSpPr>
           <p:nvPr/>
         </p:nvCxnSpPr>
         <p:spPr>
           <a:xfrm flipV="1">
-            <a:off x="3983286" y="3076279"/>
-            <a:ext cx="6242614" cy="872864"/>
+            <a:off x="3953302" y="3076279"/>
+            <a:ext cx="6272598" cy="916482"/>
           </a:xfrm>
           <a:prstGeom prst="straightConnector1">
             <a:avLst/>
@@ -5379,9 +5573,9 @@
           <p:nvPr/>
         </p:nvCxnSpPr>
         <p:spPr>
-          <a:xfrm>
-            <a:off x="3357372" y="1973821"/>
-            <a:ext cx="0" cy="573796"/>
+          <a:xfrm flipH="1">
+            <a:off x="3307226" y="1973821"/>
+            <a:ext cx="2851" cy="371688"/>
           </a:xfrm>
           <a:prstGeom prst="straightConnector1">
             <a:avLst/>
@@ -5416,15 +5610,16 @@
             </a:extLst>
           </p:cNvPr>
           <p:cNvCxnSpPr>
+            <a:cxnSpLocks/>
             <a:stCxn id="49" idx="2"/>
             <a:endCxn id="52" idx="0"/>
           </p:cNvCxnSpPr>
           <p:nvPr/>
         </p:nvCxnSpPr>
         <p:spPr>
-          <a:xfrm flipH="1">
-            <a:off x="3353750" y="3430003"/>
-            <a:ext cx="3622" cy="262258"/>
+          <a:xfrm>
+            <a:off x="3307226" y="3585250"/>
+            <a:ext cx="1985" cy="275546"/>
           </a:xfrm>
           <a:prstGeom prst="straightConnector1">
             <a:avLst/>
@@ -5755,7 +5950,7 @@
         </p:nvSpPr>
         <p:spPr>
           <a:xfrm>
-            <a:off x="2483777" y="2196342"/>
+            <a:off x="2389417" y="2204879"/>
             <a:ext cx="1865583" cy="3629425"/>
           </a:xfrm>
           <a:prstGeom prst="rect">

</xml_diff>